<commit_message>
figs w predicted vs empirical equil freqs for other viruses
 - Added panel with similarity for all viruses as Fig 3B
 - Moved detailed comparison for other viruses from Fig 3B to Fig S2
 - Moved old Fig S2 to be Fig S3
</commit_message>
<xml_diff>
--- a/paper_figures/fig_3.pptx
+++ b/paper_figures/fig_3.pptx
@@ -2,12 +2,12 @@
 <file path=ppt/presentation.xml><?xml version="1.0" encoding="utf-8"?>
 <p:presentation xmlns:a="http://schemas.openxmlformats.org/drawingml/2006/main" xmlns:r="http://schemas.openxmlformats.org/officeDocument/2006/relationships" xmlns:p="http://schemas.openxmlformats.org/presentationml/2006/main" saveSubsetFonts="1" autoCompressPictures="0">
   <p:sldMasterIdLst>
-    <p:sldMasterId id="2147483696" r:id="rId1"/>
+    <p:sldMasterId id="2147483720" r:id="rId1"/>
   </p:sldMasterIdLst>
   <p:sldIdLst>
     <p:sldId id="256" r:id="rId2"/>
   </p:sldIdLst>
-  <p:sldSz cx="6400800" cy="8686800"/>
+  <p:sldSz cx="6400800" cy="9601200"/>
   <p:notesSz cx="6858000" cy="9144000"/>
   <p:defaultTextStyle>
     <a:defPPr>
@@ -104,7 +104,781 @@
       </a:defRPr>
     </a:lvl9pPr>
   </p:defaultTextStyle>
+  <p:extLst>
+    <p:ext uri="{EFAFB233-063F-42B5-8137-9DF3F51BA10A}">
+      <p15:sldGuideLst xmlns:p15="http://schemas.microsoft.com/office/powerpoint/2012/main"/>
+    </p:ext>
+  </p:extLst>
 </p:presentation>
+</file>
+
+<file path=ppt/revisionInfo.xml><?xml version="1.0" encoding="utf-8"?>
+<p1510:revInfo xmlns:a="http://schemas.openxmlformats.org/drawingml/2006/main" xmlns:r="http://schemas.openxmlformats.org/officeDocument/2006/relationships" xmlns:p1510="http://schemas.microsoft.com/office/powerpoint/2015/10/main">
+  <p1510:revLst>
+    <p1510:client id="{A5DBB2E7-5245-E34B-9D3F-B2997EE571C2}" v="7" dt="2023-02-04T14:30:17.576"/>
+  </p1510:revLst>
+</p1510:revInfo>
+</file>
+
+<file path=ppt/changesInfos/changesInfo1.xml><?xml version="1.0" encoding="utf-8"?>
+<pc:chgInfo xmlns:a="http://schemas.openxmlformats.org/drawingml/2006/main" xmlns:r="http://schemas.openxmlformats.org/officeDocument/2006/relationships" xmlns:ac="http://schemas.microsoft.com/office/drawing/2013/main/command" xmlns:pc="http://schemas.microsoft.com/office/powerpoint/2013/main/command">
+  <pc:docChgLst>
+    <pc:chgData name="Bloom PhD, Jesse D" userId="e17e4af4-92ba-4f4f-89d8-f6d4f5501821" providerId="ADAL" clId="{A5DBB2E7-5245-E34B-9D3F-B2997EE571C2}"/>
+    <pc:docChg chg="custSel modSld modMainMaster">
+      <pc:chgData name="Bloom PhD, Jesse D" userId="e17e4af4-92ba-4f4f-89d8-f6d4f5501821" providerId="ADAL" clId="{A5DBB2E7-5245-E34B-9D3F-B2997EE571C2}" dt="2023-02-04T14:30:17.576" v="145"/>
+      <pc:docMkLst>
+        <pc:docMk/>
+      </pc:docMkLst>
+      <pc:sldChg chg="addSp delSp modSp mod">
+        <pc:chgData name="Bloom PhD, Jesse D" userId="e17e4af4-92ba-4f4f-89d8-f6d4f5501821" providerId="ADAL" clId="{A5DBB2E7-5245-E34B-9D3F-B2997EE571C2}" dt="2023-02-04T14:30:17.576" v="145"/>
+        <pc:sldMkLst>
+          <pc:docMk/>
+          <pc:sldMk cId="1355291295" sldId="256"/>
+        </pc:sldMkLst>
+        <pc:spChg chg="add del mod">
+          <ac:chgData name="Bloom PhD, Jesse D" userId="e17e4af4-92ba-4f4f-89d8-f6d4f5501821" providerId="ADAL" clId="{A5DBB2E7-5245-E34B-9D3F-B2997EE571C2}" dt="2023-02-04T14:30:04.524" v="143" actId="21"/>
+          <ac:spMkLst>
+            <pc:docMk/>
+            <pc:sldMk cId="1355291295" sldId="256"/>
+            <ac:spMk id="5" creationId="{EAD654FF-9C98-BCE7-0BD8-2FB97E92890E}"/>
+          </ac:spMkLst>
+        </pc:spChg>
+        <pc:spChg chg="add del mod">
+          <ac:chgData name="Bloom PhD, Jesse D" userId="e17e4af4-92ba-4f4f-89d8-f6d4f5501821" providerId="ADAL" clId="{A5DBB2E7-5245-E34B-9D3F-B2997EE571C2}" dt="2023-02-04T14:30:04.524" v="143" actId="21"/>
+          <ac:spMkLst>
+            <pc:docMk/>
+            <pc:sldMk cId="1355291295" sldId="256"/>
+            <ac:spMk id="6" creationId="{17ECBA73-8052-5DCE-2875-7046DFC3EB5A}"/>
+          </ac:spMkLst>
+        </pc:spChg>
+        <pc:spChg chg="add del mod">
+          <ac:chgData name="Bloom PhD, Jesse D" userId="e17e4af4-92ba-4f4f-89d8-f6d4f5501821" providerId="ADAL" clId="{A5DBB2E7-5245-E34B-9D3F-B2997EE571C2}" dt="2023-02-04T14:30:04.524" v="143" actId="21"/>
+          <ac:spMkLst>
+            <pc:docMk/>
+            <pc:sldMk cId="1355291295" sldId="256"/>
+            <ac:spMk id="7" creationId="{D7215E06-EE3C-A2DB-3F59-3858D892A36B}"/>
+          </ac:spMkLst>
+        </pc:spChg>
+        <pc:spChg chg="add del mod">
+          <ac:chgData name="Bloom PhD, Jesse D" userId="e17e4af4-92ba-4f4f-89d8-f6d4f5501821" providerId="ADAL" clId="{A5DBB2E7-5245-E34B-9D3F-B2997EE571C2}" dt="2023-02-04T14:30:04.524" v="143" actId="21"/>
+          <ac:spMkLst>
+            <pc:docMk/>
+            <pc:sldMk cId="1355291295" sldId="256"/>
+            <ac:spMk id="8" creationId="{B1F62B4F-1EF6-4C98-DA76-462E9680FDFE}"/>
+          </ac:spMkLst>
+        </pc:spChg>
+        <pc:spChg chg="add del mod">
+          <ac:chgData name="Bloom PhD, Jesse D" userId="e17e4af4-92ba-4f4f-89d8-f6d4f5501821" providerId="ADAL" clId="{A5DBB2E7-5245-E34B-9D3F-B2997EE571C2}" dt="2023-02-04T14:30:04.524" v="143" actId="21"/>
+          <ac:spMkLst>
+            <pc:docMk/>
+            <pc:sldMk cId="1355291295" sldId="256"/>
+            <ac:spMk id="9" creationId="{0A6001E7-DA83-61AE-C5B0-0DA034B225C7}"/>
+          </ac:spMkLst>
+        </pc:spChg>
+        <pc:spChg chg="add del mod">
+          <ac:chgData name="Bloom PhD, Jesse D" userId="e17e4af4-92ba-4f4f-89d8-f6d4f5501821" providerId="ADAL" clId="{A5DBB2E7-5245-E34B-9D3F-B2997EE571C2}" dt="2023-02-04T14:30:04.524" v="143" actId="21"/>
+          <ac:spMkLst>
+            <pc:docMk/>
+            <pc:sldMk cId="1355291295" sldId="256"/>
+            <ac:spMk id="11" creationId="{28E3DC13-5597-A5EB-1EDF-B84D30DE1219}"/>
+          </ac:spMkLst>
+        </pc:spChg>
+        <pc:spChg chg="add mod">
+          <ac:chgData name="Bloom PhD, Jesse D" userId="e17e4af4-92ba-4f4f-89d8-f6d4f5501821" providerId="ADAL" clId="{A5DBB2E7-5245-E34B-9D3F-B2997EE571C2}" dt="2023-02-04T14:30:17.576" v="145"/>
+          <ac:spMkLst>
+            <pc:docMk/>
+            <pc:sldMk cId="1355291295" sldId="256"/>
+            <ac:spMk id="14" creationId="{FDEE8D28-1497-2F96-8E39-EDDE729930E9}"/>
+          </ac:spMkLst>
+        </pc:spChg>
+        <pc:spChg chg="add mod">
+          <ac:chgData name="Bloom PhD, Jesse D" userId="e17e4af4-92ba-4f4f-89d8-f6d4f5501821" providerId="ADAL" clId="{A5DBB2E7-5245-E34B-9D3F-B2997EE571C2}" dt="2023-02-04T14:30:17.576" v="145"/>
+          <ac:spMkLst>
+            <pc:docMk/>
+            <pc:sldMk cId="1355291295" sldId="256"/>
+            <ac:spMk id="15" creationId="{D7763EE5-86B5-1C08-C335-B5DCF5FA049F}"/>
+          </ac:spMkLst>
+        </pc:spChg>
+        <pc:spChg chg="add mod">
+          <ac:chgData name="Bloom PhD, Jesse D" userId="e17e4af4-92ba-4f4f-89d8-f6d4f5501821" providerId="ADAL" clId="{A5DBB2E7-5245-E34B-9D3F-B2997EE571C2}" dt="2023-02-04T14:30:17.576" v="145"/>
+          <ac:spMkLst>
+            <pc:docMk/>
+            <pc:sldMk cId="1355291295" sldId="256"/>
+            <ac:spMk id="16" creationId="{2C92F0E5-CA4A-95FF-E49D-A54246A347FB}"/>
+          </ac:spMkLst>
+        </pc:spChg>
+        <pc:spChg chg="add mod">
+          <ac:chgData name="Bloom PhD, Jesse D" userId="e17e4af4-92ba-4f4f-89d8-f6d4f5501821" providerId="ADAL" clId="{A5DBB2E7-5245-E34B-9D3F-B2997EE571C2}" dt="2023-02-04T14:30:17.576" v="145"/>
+          <ac:spMkLst>
+            <pc:docMk/>
+            <pc:sldMk cId="1355291295" sldId="256"/>
+            <ac:spMk id="17" creationId="{568D735F-D4C3-88C2-7C82-55F35C5F1405}"/>
+          </ac:spMkLst>
+        </pc:spChg>
+        <pc:spChg chg="add mod">
+          <ac:chgData name="Bloom PhD, Jesse D" userId="e17e4af4-92ba-4f4f-89d8-f6d4f5501821" providerId="ADAL" clId="{A5DBB2E7-5245-E34B-9D3F-B2997EE571C2}" dt="2023-02-04T14:30:17.576" v="145"/>
+          <ac:spMkLst>
+            <pc:docMk/>
+            <pc:sldMk cId="1355291295" sldId="256"/>
+            <ac:spMk id="18" creationId="{887C3C75-F1F8-C43B-FA32-7A0FACC1F404}"/>
+          </ac:spMkLst>
+        </pc:spChg>
+        <pc:spChg chg="add mod">
+          <ac:chgData name="Bloom PhD, Jesse D" userId="e17e4af4-92ba-4f4f-89d8-f6d4f5501821" providerId="ADAL" clId="{A5DBB2E7-5245-E34B-9D3F-B2997EE571C2}" dt="2023-02-04T14:30:17.576" v="145"/>
+          <ac:spMkLst>
+            <pc:docMk/>
+            <pc:sldMk cId="1355291295" sldId="256"/>
+            <ac:spMk id="19" creationId="{35EF74F8-6A0A-19C5-9C59-472F69D4C866}"/>
+          </ac:spMkLst>
+        </pc:spChg>
+        <pc:spChg chg="del">
+          <ac:chgData name="Bloom PhD, Jesse D" userId="e17e4af4-92ba-4f4f-89d8-f6d4f5501821" providerId="ADAL" clId="{A5DBB2E7-5245-E34B-9D3F-B2997EE571C2}" dt="2023-02-04T14:27:26.143" v="3" actId="21"/>
+          <ac:spMkLst>
+            <pc:docMk/>
+            <pc:sldMk cId="1355291295" sldId="256"/>
+            <ac:spMk id="22" creationId="{64FB362D-D69E-F5D5-D4F9-CA7FE4106302}"/>
+          </ac:spMkLst>
+        </pc:spChg>
+        <pc:spChg chg="del">
+          <ac:chgData name="Bloom PhD, Jesse D" userId="e17e4af4-92ba-4f4f-89d8-f6d4f5501821" providerId="ADAL" clId="{A5DBB2E7-5245-E34B-9D3F-B2997EE571C2}" dt="2023-02-04T14:27:26.143" v="3" actId="21"/>
+          <ac:spMkLst>
+            <pc:docMk/>
+            <pc:sldMk cId="1355291295" sldId="256"/>
+            <ac:spMk id="23" creationId="{B31E2236-E698-2E98-7FC6-A0E7503AD06D}"/>
+          </ac:spMkLst>
+        </pc:spChg>
+        <pc:spChg chg="del">
+          <ac:chgData name="Bloom PhD, Jesse D" userId="e17e4af4-92ba-4f4f-89d8-f6d4f5501821" providerId="ADAL" clId="{A5DBB2E7-5245-E34B-9D3F-B2997EE571C2}" dt="2023-02-04T14:27:26.143" v="3" actId="21"/>
+          <ac:spMkLst>
+            <pc:docMk/>
+            <pc:sldMk cId="1355291295" sldId="256"/>
+            <ac:spMk id="27" creationId="{81935E4B-29A4-A77C-70CA-D721FF55B503}"/>
+          </ac:spMkLst>
+        </pc:spChg>
+        <pc:spChg chg="del">
+          <ac:chgData name="Bloom PhD, Jesse D" userId="e17e4af4-92ba-4f4f-89d8-f6d4f5501821" providerId="ADAL" clId="{A5DBB2E7-5245-E34B-9D3F-B2997EE571C2}" dt="2023-02-04T14:27:26.143" v="3" actId="21"/>
+          <ac:spMkLst>
+            <pc:docMk/>
+            <pc:sldMk cId="1355291295" sldId="256"/>
+            <ac:spMk id="28" creationId="{BD883556-9D30-97A9-DC05-606C85EB9C1E}"/>
+          </ac:spMkLst>
+        </pc:spChg>
+        <pc:spChg chg="del">
+          <ac:chgData name="Bloom PhD, Jesse D" userId="e17e4af4-92ba-4f4f-89d8-f6d4f5501821" providerId="ADAL" clId="{A5DBB2E7-5245-E34B-9D3F-B2997EE571C2}" dt="2023-02-04T14:27:26.143" v="3" actId="21"/>
+          <ac:spMkLst>
+            <pc:docMk/>
+            <pc:sldMk cId="1355291295" sldId="256"/>
+            <ac:spMk id="29" creationId="{A6FEEB7C-E4F7-AA87-AA80-A2FB65C7E3AB}"/>
+          </ac:spMkLst>
+        </pc:spChg>
+        <pc:grpChg chg="del">
+          <ac:chgData name="Bloom PhD, Jesse D" userId="e17e4af4-92ba-4f4f-89d8-f6d4f5501821" providerId="ADAL" clId="{A5DBB2E7-5245-E34B-9D3F-B2997EE571C2}" dt="2023-02-04T14:26:48.258" v="0" actId="478"/>
+          <ac:grpSpMkLst>
+            <pc:docMk/>
+            <pc:sldMk cId="1355291295" sldId="256"/>
+            <ac:grpSpMk id="24" creationId="{830858C5-0C1D-5F2D-E231-7D7D07423A8C}"/>
+          </ac:grpSpMkLst>
+        </pc:grpChg>
+        <pc:picChg chg="add del mod">
+          <ac:chgData name="Bloom PhD, Jesse D" userId="e17e4af4-92ba-4f4f-89d8-f6d4f5501821" providerId="ADAL" clId="{A5DBB2E7-5245-E34B-9D3F-B2997EE571C2}" dt="2023-02-04T14:27:26.143" v="3" actId="21"/>
+          <ac:picMkLst>
+            <pc:docMk/>
+            <pc:sldMk cId="1355291295" sldId="256"/>
+            <ac:picMk id="3" creationId="{1B691448-6F6B-48B5-10A8-9D7D4A3AFC43}"/>
+          </ac:picMkLst>
+        </pc:picChg>
+        <pc:picChg chg="add del mod">
+          <ac:chgData name="Bloom PhD, Jesse D" userId="e17e4af4-92ba-4f4f-89d8-f6d4f5501821" providerId="ADAL" clId="{A5DBB2E7-5245-E34B-9D3F-B2997EE571C2}" dt="2023-02-04T14:30:04.524" v="143" actId="21"/>
+          <ac:picMkLst>
+            <pc:docMk/>
+            <pc:sldMk cId="1355291295" sldId="256"/>
+            <ac:picMk id="4" creationId="{64234489-9808-2E01-2022-30848F3FF719}"/>
+          </ac:picMkLst>
+        </pc:picChg>
+        <pc:picChg chg="add del mod">
+          <ac:chgData name="Bloom PhD, Jesse D" userId="e17e4af4-92ba-4f4f-89d8-f6d4f5501821" providerId="ADAL" clId="{A5DBB2E7-5245-E34B-9D3F-B2997EE571C2}" dt="2023-02-04T14:30:04.524" v="143" actId="21"/>
+          <ac:picMkLst>
+            <pc:docMk/>
+            <pc:sldMk cId="1355291295" sldId="256"/>
+            <ac:picMk id="10" creationId="{049DDBE8-F49F-F8BA-A81D-FFBDEE27C472}"/>
+          </ac:picMkLst>
+        </pc:picChg>
+        <pc:picChg chg="add mod">
+          <ac:chgData name="Bloom PhD, Jesse D" userId="e17e4af4-92ba-4f4f-89d8-f6d4f5501821" providerId="ADAL" clId="{A5DBB2E7-5245-E34B-9D3F-B2997EE571C2}" dt="2023-02-04T14:30:17.576" v="145"/>
+          <ac:picMkLst>
+            <pc:docMk/>
+            <pc:sldMk cId="1355291295" sldId="256"/>
+            <ac:picMk id="12" creationId="{7D17704C-BA97-98F5-DC45-AED0DBEAB958}"/>
+          </ac:picMkLst>
+        </pc:picChg>
+        <pc:picChg chg="add mod">
+          <ac:chgData name="Bloom PhD, Jesse D" userId="e17e4af4-92ba-4f4f-89d8-f6d4f5501821" providerId="ADAL" clId="{A5DBB2E7-5245-E34B-9D3F-B2997EE571C2}" dt="2023-02-04T14:30:17.576" v="145"/>
+          <ac:picMkLst>
+            <pc:docMk/>
+            <pc:sldMk cId="1355291295" sldId="256"/>
+            <ac:picMk id="13" creationId="{FAD14122-3D69-5E63-4E32-B250DB6BD7AF}"/>
+          </ac:picMkLst>
+        </pc:picChg>
+        <pc:picChg chg="del">
+          <ac:chgData name="Bloom PhD, Jesse D" userId="e17e4af4-92ba-4f4f-89d8-f6d4f5501821" providerId="ADAL" clId="{A5DBB2E7-5245-E34B-9D3F-B2997EE571C2}" dt="2023-02-04T14:27:26.143" v="3" actId="21"/>
+          <ac:picMkLst>
+            <pc:docMk/>
+            <pc:sldMk cId="1355291295" sldId="256"/>
+            <ac:picMk id="21" creationId="{8F5EA54D-7DC8-F339-1482-2FCDCBB36693}"/>
+          </ac:picMkLst>
+        </pc:picChg>
+      </pc:sldChg>
+      <pc:sldMasterChg chg="modSp modSldLayout">
+        <pc:chgData name="Bloom PhD, Jesse D" userId="e17e4af4-92ba-4f4f-89d8-f6d4f5501821" providerId="ADAL" clId="{A5DBB2E7-5245-E34B-9D3F-B2997EE571C2}" dt="2023-02-04T14:27:35.894" v="4"/>
+        <pc:sldMasterMkLst>
+          <pc:docMk/>
+          <pc:sldMasterMk cId="3615336018" sldId="2147483696"/>
+        </pc:sldMasterMkLst>
+        <pc:spChg chg="mod">
+          <ac:chgData name="Bloom PhD, Jesse D" userId="e17e4af4-92ba-4f4f-89d8-f6d4f5501821" providerId="ADAL" clId="{A5DBB2E7-5245-E34B-9D3F-B2997EE571C2}" dt="2023-02-04T14:27:35.894" v="4"/>
+          <ac:spMkLst>
+            <pc:docMk/>
+            <pc:sldMasterMk cId="3615336018" sldId="2147483696"/>
+            <ac:spMk id="2" creationId="{00000000-0000-0000-0000-000000000000}"/>
+          </ac:spMkLst>
+        </pc:spChg>
+        <pc:spChg chg="mod">
+          <ac:chgData name="Bloom PhD, Jesse D" userId="e17e4af4-92ba-4f4f-89d8-f6d4f5501821" providerId="ADAL" clId="{A5DBB2E7-5245-E34B-9D3F-B2997EE571C2}" dt="2023-02-04T14:27:35.894" v="4"/>
+          <ac:spMkLst>
+            <pc:docMk/>
+            <pc:sldMasterMk cId="3615336018" sldId="2147483696"/>
+            <ac:spMk id="3" creationId="{00000000-0000-0000-0000-000000000000}"/>
+          </ac:spMkLst>
+        </pc:spChg>
+        <pc:spChg chg="mod">
+          <ac:chgData name="Bloom PhD, Jesse D" userId="e17e4af4-92ba-4f4f-89d8-f6d4f5501821" providerId="ADAL" clId="{A5DBB2E7-5245-E34B-9D3F-B2997EE571C2}" dt="2023-02-04T14:27:35.894" v="4"/>
+          <ac:spMkLst>
+            <pc:docMk/>
+            <pc:sldMasterMk cId="3615336018" sldId="2147483696"/>
+            <ac:spMk id="4" creationId="{00000000-0000-0000-0000-000000000000}"/>
+          </ac:spMkLst>
+        </pc:spChg>
+        <pc:spChg chg="mod">
+          <ac:chgData name="Bloom PhD, Jesse D" userId="e17e4af4-92ba-4f4f-89d8-f6d4f5501821" providerId="ADAL" clId="{A5DBB2E7-5245-E34B-9D3F-B2997EE571C2}" dt="2023-02-04T14:27:35.894" v="4"/>
+          <ac:spMkLst>
+            <pc:docMk/>
+            <pc:sldMasterMk cId="3615336018" sldId="2147483696"/>
+            <ac:spMk id="5" creationId="{00000000-0000-0000-0000-000000000000}"/>
+          </ac:spMkLst>
+        </pc:spChg>
+        <pc:spChg chg="mod">
+          <ac:chgData name="Bloom PhD, Jesse D" userId="e17e4af4-92ba-4f4f-89d8-f6d4f5501821" providerId="ADAL" clId="{A5DBB2E7-5245-E34B-9D3F-B2997EE571C2}" dt="2023-02-04T14:27:35.894" v="4"/>
+          <ac:spMkLst>
+            <pc:docMk/>
+            <pc:sldMasterMk cId="3615336018" sldId="2147483696"/>
+            <ac:spMk id="6" creationId="{00000000-0000-0000-0000-000000000000}"/>
+          </ac:spMkLst>
+        </pc:spChg>
+        <pc:sldLayoutChg chg="modSp">
+          <pc:chgData name="Bloom PhD, Jesse D" userId="e17e4af4-92ba-4f4f-89d8-f6d4f5501821" providerId="ADAL" clId="{A5DBB2E7-5245-E34B-9D3F-B2997EE571C2}" dt="2023-02-04T14:27:35.894" v="4"/>
+          <pc:sldLayoutMkLst>
+            <pc:docMk/>
+            <pc:sldMasterMk cId="3615336018" sldId="2147483696"/>
+            <pc:sldLayoutMk cId="2936179978" sldId="2147483697"/>
+          </pc:sldLayoutMkLst>
+          <pc:spChg chg="mod">
+            <ac:chgData name="Bloom PhD, Jesse D" userId="e17e4af4-92ba-4f4f-89d8-f6d4f5501821" providerId="ADAL" clId="{A5DBB2E7-5245-E34B-9D3F-B2997EE571C2}" dt="2023-02-04T14:27:35.894" v="4"/>
+            <ac:spMkLst>
+              <pc:docMk/>
+              <pc:sldMasterMk cId="3615336018" sldId="2147483696"/>
+              <pc:sldLayoutMk cId="2936179978" sldId="2147483697"/>
+              <ac:spMk id="2" creationId="{00000000-0000-0000-0000-000000000000}"/>
+            </ac:spMkLst>
+          </pc:spChg>
+          <pc:spChg chg="mod">
+            <ac:chgData name="Bloom PhD, Jesse D" userId="e17e4af4-92ba-4f4f-89d8-f6d4f5501821" providerId="ADAL" clId="{A5DBB2E7-5245-E34B-9D3F-B2997EE571C2}" dt="2023-02-04T14:27:35.894" v="4"/>
+            <ac:spMkLst>
+              <pc:docMk/>
+              <pc:sldMasterMk cId="3615336018" sldId="2147483696"/>
+              <pc:sldLayoutMk cId="2936179978" sldId="2147483697"/>
+              <ac:spMk id="3" creationId="{00000000-0000-0000-0000-000000000000}"/>
+            </ac:spMkLst>
+          </pc:spChg>
+        </pc:sldLayoutChg>
+        <pc:sldLayoutChg chg="modSp">
+          <pc:chgData name="Bloom PhD, Jesse D" userId="e17e4af4-92ba-4f4f-89d8-f6d4f5501821" providerId="ADAL" clId="{A5DBB2E7-5245-E34B-9D3F-B2997EE571C2}" dt="2023-02-04T14:27:35.894" v="4"/>
+          <pc:sldLayoutMkLst>
+            <pc:docMk/>
+            <pc:sldMasterMk cId="3615336018" sldId="2147483696"/>
+            <pc:sldLayoutMk cId="3998121419" sldId="2147483699"/>
+          </pc:sldLayoutMkLst>
+          <pc:spChg chg="mod">
+            <ac:chgData name="Bloom PhD, Jesse D" userId="e17e4af4-92ba-4f4f-89d8-f6d4f5501821" providerId="ADAL" clId="{A5DBB2E7-5245-E34B-9D3F-B2997EE571C2}" dt="2023-02-04T14:27:35.894" v="4"/>
+            <ac:spMkLst>
+              <pc:docMk/>
+              <pc:sldMasterMk cId="3615336018" sldId="2147483696"/>
+              <pc:sldLayoutMk cId="3998121419" sldId="2147483699"/>
+              <ac:spMk id="2" creationId="{00000000-0000-0000-0000-000000000000}"/>
+            </ac:spMkLst>
+          </pc:spChg>
+          <pc:spChg chg="mod">
+            <ac:chgData name="Bloom PhD, Jesse D" userId="e17e4af4-92ba-4f4f-89d8-f6d4f5501821" providerId="ADAL" clId="{A5DBB2E7-5245-E34B-9D3F-B2997EE571C2}" dt="2023-02-04T14:27:35.894" v="4"/>
+            <ac:spMkLst>
+              <pc:docMk/>
+              <pc:sldMasterMk cId="3615336018" sldId="2147483696"/>
+              <pc:sldLayoutMk cId="3998121419" sldId="2147483699"/>
+              <ac:spMk id="3" creationId="{00000000-0000-0000-0000-000000000000}"/>
+            </ac:spMkLst>
+          </pc:spChg>
+        </pc:sldLayoutChg>
+        <pc:sldLayoutChg chg="modSp">
+          <pc:chgData name="Bloom PhD, Jesse D" userId="e17e4af4-92ba-4f4f-89d8-f6d4f5501821" providerId="ADAL" clId="{A5DBB2E7-5245-E34B-9D3F-B2997EE571C2}" dt="2023-02-04T14:27:35.894" v="4"/>
+          <pc:sldLayoutMkLst>
+            <pc:docMk/>
+            <pc:sldMasterMk cId="3615336018" sldId="2147483696"/>
+            <pc:sldLayoutMk cId="1682492879" sldId="2147483700"/>
+          </pc:sldLayoutMkLst>
+          <pc:spChg chg="mod">
+            <ac:chgData name="Bloom PhD, Jesse D" userId="e17e4af4-92ba-4f4f-89d8-f6d4f5501821" providerId="ADAL" clId="{A5DBB2E7-5245-E34B-9D3F-B2997EE571C2}" dt="2023-02-04T14:27:35.894" v="4"/>
+            <ac:spMkLst>
+              <pc:docMk/>
+              <pc:sldMasterMk cId="3615336018" sldId="2147483696"/>
+              <pc:sldLayoutMk cId="1682492879" sldId="2147483700"/>
+              <ac:spMk id="3" creationId="{00000000-0000-0000-0000-000000000000}"/>
+            </ac:spMkLst>
+          </pc:spChg>
+          <pc:spChg chg="mod">
+            <ac:chgData name="Bloom PhD, Jesse D" userId="e17e4af4-92ba-4f4f-89d8-f6d4f5501821" providerId="ADAL" clId="{A5DBB2E7-5245-E34B-9D3F-B2997EE571C2}" dt="2023-02-04T14:27:35.894" v="4"/>
+            <ac:spMkLst>
+              <pc:docMk/>
+              <pc:sldMasterMk cId="3615336018" sldId="2147483696"/>
+              <pc:sldLayoutMk cId="1682492879" sldId="2147483700"/>
+              <ac:spMk id="4" creationId="{00000000-0000-0000-0000-000000000000}"/>
+            </ac:spMkLst>
+          </pc:spChg>
+        </pc:sldLayoutChg>
+        <pc:sldLayoutChg chg="modSp">
+          <pc:chgData name="Bloom PhD, Jesse D" userId="e17e4af4-92ba-4f4f-89d8-f6d4f5501821" providerId="ADAL" clId="{A5DBB2E7-5245-E34B-9D3F-B2997EE571C2}" dt="2023-02-04T14:27:35.894" v="4"/>
+          <pc:sldLayoutMkLst>
+            <pc:docMk/>
+            <pc:sldMasterMk cId="3615336018" sldId="2147483696"/>
+            <pc:sldLayoutMk cId="3628088772" sldId="2147483701"/>
+          </pc:sldLayoutMkLst>
+          <pc:spChg chg="mod">
+            <ac:chgData name="Bloom PhD, Jesse D" userId="e17e4af4-92ba-4f4f-89d8-f6d4f5501821" providerId="ADAL" clId="{A5DBB2E7-5245-E34B-9D3F-B2997EE571C2}" dt="2023-02-04T14:27:35.894" v="4"/>
+            <ac:spMkLst>
+              <pc:docMk/>
+              <pc:sldMasterMk cId="3615336018" sldId="2147483696"/>
+              <pc:sldLayoutMk cId="3628088772" sldId="2147483701"/>
+              <ac:spMk id="2" creationId="{00000000-0000-0000-0000-000000000000}"/>
+            </ac:spMkLst>
+          </pc:spChg>
+          <pc:spChg chg="mod">
+            <ac:chgData name="Bloom PhD, Jesse D" userId="e17e4af4-92ba-4f4f-89d8-f6d4f5501821" providerId="ADAL" clId="{A5DBB2E7-5245-E34B-9D3F-B2997EE571C2}" dt="2023-02-04T14:27:35.894" v="4"/>
+            <ac:spMkLst>
+              <pc:docMk/>
+              <pc:sldMasterMk cId="3615336018" sldId="2147483696"/>
+              <pc:sldLayoutMk cId="3628088772" sldId="2147483701"/>
+              <ac:spMk id="3" creationId="{00000000-0000-0000-0000-000000000000}"/>
+            </ac:spMkLst>
+          </pc:spChg>
+          <pc:spChg chg="mod">
+            <ac:chgData name="Bloom PhD, Jesse D" userId="e17e4af4-92ba-4f4f-89d8-f6d4f5501821" providerId="ADAL" clId="{A5DBB2E7-5245-E34B-9D3F-B2997EE571C2}" dt="2023-02-04T14:27:35.894" v="4"/>
+            <ac:spMkLst>
+              <pc:docMk/>
+              <pc:sldMasterMk cId="3615336018" sldId="2147483696"/>
+              <pc:sldLayoutMk cId="3628088772" sldId="2147483701"/>
+              <ac:spMk id="4" creationId="{00000000-0000-0000-0000-000000000000}"/>
+            </ac:spMkLst>
+          </pc:spChg>
+          <pc:spChg chg="mod">
+            <ac:chgData name="Bloom PhD, Jesse D" userId="e17e4af4-92ba-4f4f-89d8-f6d4f5501821" providerId="ADAL" clId="{A5DBB2E7-5245-E34B-9D3F-B2997EE571C2}" dt="2023-02-04T14:27:35.894" v="4"/>
+            <ac:spMkLst>
+              <pc:docMk/>
+              <pc:sldMasterMk cId="3615336018" sldId="2147483696"/>
+              <pc:sldLayoutMk cId="3628088772" sldId="2147483701"/>
+              <ac:spMk id="5" creationId="{00000000-0000-0000-0000-000000000000}"/>
+            </ac:spMkLst>
+          </pc:spChg>
+          <pc:spChg chg="mod">
+            <ac:chgData name="Bloom PhD, Jesse D" userId="e17e4af4-92ba-4f4f-89d8-f6d4f5501821" providerId="ADAL" clId="{A5DBB2E7-5245-E34B-9D3F-B2997EE571C2}" dt="2023-02-04T14:27:35.894" v="4"/>
+            <ac:spMkLst>
+              <pc:docMk/>
+              <pc:sldMasterMk cId="3615336018" sldId="2147483696"/>
+              <pc:sldLayoutMk cId="3628088772" sldId="2147483701"/>
+              <ac:spMk id="6" creationId="{00000000-0000-0000-0000-000000000000}"/>
+            </ac:spMkLst>
+          </pc:spChg>
+        </pc:sldLayoutChg>
+        <pc:sldLayoutChg chg="modSp">
+          <pc:chgData name="Bloom PhD, Jesse D" userId="e17e4af4-92ba-4f4f-89d8-f6d4f5501821" providerId="ADAL" clId="{A5DBB2E7-5245-E34B-9D3F-B2997EE571C2}" dt="2023-02-04T14:27:35.894" v="4"/>
+          <pc:sldLayoutMkLst>
+            <pc:docMk/>
+            <pc:sldMasterMk cId="3615336018" sldId="2147483696"/>
+            <pc:sldLayoutMk cId="436875253" sldId="2147483704"/>
+          </pc:sldLayoutMkLst>
+          <pc:spChg chg="mod">
+            <ac:chgData name="Bloom PhD, Jesse D" userId="e17e4af4-92ba-4f4f-89d8-f6d4f5501821" providerId="ADAL" clId="{A5DBB2E7-5245-E34B-9D3F-B2997EE571C2}" dt="2023-02-04T14:27:35.894" v="4"/>
+            <ac:spMkLst>
+              <pc:docMk/>
+              <pc:sldMasterMk cId="3615336018" sldId="2147483696"/>
+              <pc:sldLayoutMk cId="436875253" sldId="2147483704"/>
+              <ac:spMk id="2" creationId="{00000000-0000-0000-0000-000000000000}"/>
+            </ac:spMkLst>
+          </pc:spChg>
+          <pc:spChg chg="mod">
+            <ac:chgData name="Bloom PhD, Jesse D" userId="e17e4af4-92ba-4f4f-89d8-f6d4f5501821" providerId="ADAL" clId="{A5DBB2E7-5245-E34B-9D3F-B2997EE571C2}" dt="2023-02-04T14:27:35.894" v="4"/>
+            <ac:spMkLst>
+              <pc:docMk/>
+              <pc:sldMasterMk cId="3615336018" sldId="2147483696"/>
+              <pc:sldLayoutMk cId="436875253" sldId="2147483704"/>
+              <ac:spMk id="3" creationId="{00000000-0000-0000-0000-000000000000}"/>
+            </ac:spMkLst>
+          </pc:spChg>
+          <pc:spChg chg="mod">
+            <ac:chgData name="Bloom PhD, Jesse D" userId="e17e4af4-92ba-4f4f-89d8-f6d4f5501821" providerId="ADAL" clId="{A5DBB2E7-5245-E34B-9D3F-B2997EE571C2}" dt="2023-02-04T14:27:35.894" v="4"/>
+            <ac:spMkLst>
+              <pc:docMk/>
+              <pc:sldMasterMk cId="3615336018" sldId="2147483696"/>
+              <pc:sldLayoutMk cId="436875253" sldId="2147483704"/>
+              <ac:spMk id="4" creationId="{00000000-0000-0000-0000-000000000000}"/>
+            </ac:spMkLst>
+          </pc:spChg>
+        </pc:sldLayoutChg>
+        <pc:sldLayoutChg chg="modSp">
+          <pc:chgData name="Bloom PhD, Jesse D" userId="e17e4af4-92ba-4f4f-89d8-f6d4f5501821" providerId="ADAL" clId="{A5DBB2E7-5245-E34B-9D3F-B2997EE571C2}" dt="2023-02-04T14:27:35.894" v="4"/>
+          <pc:sldLayoutMkLst>
+            <pc:docMk/>
+            <pc:sldMasterMk cId="3615336018" sldId="2147483696"/>
+            <pc:sldLayoutMk cId="1896331358" sldId="2147483705"/>
+          </pc:sldLayoutMkLst>
+          <pc:spChg chg="mod">
+            <ac:chgData name="Bloom PhD, Jesse D" userId="e17e4af4-92ba-4f4f-89d8-f6d4f5501821" providerId="ADAL" clId="{A5DBB2E7-5245-E34B-9D3F-B2997EE571C2}" dt="2023-02-04T14:27:35.894" v="4"/>
+            <ac:spMkLst>
+              <pc:docMk/>
+              <pc:sldMasterMk cId="3615336018" sldId="2147483696"/>
+              <pc:sldLayoutMk cId="1896331358" sldId="2147483705"/>
+              <ac:spMk id="2" creationId="{00000000-0000-0000-0000-000000000000}"/>
+            </ac:spMkLst>
+          </pc:spChg>
+          <pc:spChg chg="mod">
+            <ac:chgData name="Bloom PhD, Jesse D" userId="e17e4af4-92ba-4f4f-89d8-f6d4f5501821" providerId="ADAL" clId="{A5DBB2E7-5245-E34B-9D3F-B2997EE571C2}" dt="2023-02-04T14:27:35.894" v="4"/>
+            <ac:spMkLst>
+              <pc:docMk/>
+              <pc:sldMasterMk cId="3615336018" sldId="2147483696"/>
+              <pc:sldLayoutMk cId="1896331358" sldId="2147483705"/>
+              <ac:spMk id="3" creationId="{00000000-0000-0000-0000-000000000000}"/>
+            </ac:spMkLst>
+          </pc:spChg>
+          <pc:spChg chg="mod">
+            <ac:chgData name="Bloom PhD, Jesse D" userId="e17e4af4-92ba-4f4f-89d8-f6d4f5501821" providerId="ADAL" clId="{A5DBB2E7-5245-E34B-9D3F-B2997EE571C2}" dt="2023-02-04T14:27:35.894" v="4"/>
+            <ac:spMkLst>
+              <pc:docMk/>
+              <pc:sldMasterMk cId="3615336018" sldId="2147483696"/>
+              <pc:sldLayoutMk cId="1896331358" sldId="2147483705"/>
+              <ac:spMk id="4" creationId="{00000000-0000-0000-0000-000000000000}"/>
+            </ac:spMkLst>
+          </pc:spChg>
+        </pc:sldLayoutChg>
+        <pc:sldLayoutChg chg="modSp">
+          <pc:chgData name="Bloom PhD, Jesse D" userId="e17e4af4-92ba-4f4f-89d8-f6d4f5501821" providerId="ADAL" clId="{A5DBB2E7-5245-E34B-9D3F-B2997EE571C2}" dt="2023-02-04T14:27:35.894" v="4"/>
+          <pc:sldLayoutMkLst>
+            <pc:docMk/>
+            <pc:sldMasterMk cId="3615336018" sldId="2147483696"/>
+            <pc:sldLayoutMk cId="29501061" sldId="2147483707"/>
+          </pc:sldLayoutMkLst>
+          <pc:spChg chg="mod">
+            <ac:chgData name="Bloom PhD, Jesse D" userId="e17e4af4-92ba-4f4f-89d8-f6d4f5501821" providerId="ADAL" clId="{A5DBB2E7-5245-E34B-9D3F-B2997EE571C2}" dt="2023-02-04T14:27:35.894" v="4"/>
+            <ac:spMkLst>
+              <pc:docMk/>
+              <pc:sldMasterMk cId="3615336018" sldId="2147483696"/>
+              <pc:sldLayoutMk cId="29501061" sldId="2147483707"/>
+              <ac:spMk id="2" creationId="{00000000-0000-0000-0000-000000000000}"/>
+            </ac:spMkLst>
+          </pc:spChg>
+          <pc:spChg chg="mod">
+            <ac:chgData name="Bloom PhD, Jesse D" userId="e17e4af4-92ba-4f4f-89d8-f6d4f5501821" providerId="ADAL" clId="{A5DBB2E7-5245-E34B-9D3F-B2997EE571C2}" dt="2023-02-04T14:27:35.894" v="4"/>
+            <ac:spMkLst>
+              <pc:docMk/>
+              <pc:sldMasterMk cId="3615336018" sldId="2147483696"/>
+              <pc:sldLayoutMk cId="29501061" sldId="2147483707"/>
+              <ac:spMk id="3" creationId="{00000000-0000-0000-0000-000000000000}"/>
+            </ac:spMkLst>
+          </pc:spChg>
+        </pc:sldLayoutChg>
+      </pc:sldMasterChg>
+      <pc:sldMasterChg chg="modSp modSldLayout">
+        <pc:chgData name="Bloom PhD, Jesse D" userId="e17e4af4-92ba-4f4f-89d8-f6d4f5501821" providerId="ADAL" clId="{A5DBB2E7-5245-E34B-9D3F-B2997EE571C2}" dt="2023-02-04T14:30:15.786" v="144"/>
+        <pc:sldMasterMkLst>
+          <pc:docMk/>
+          <pc:sldMasterMk cId="3100109530" sldId="2147483708"/>
+        </pc:sldMasterMkLst>
+        <pc:spChg chg="mod">
+          <ac:chgData name="Bloom PhD, Jesse D" userId="e17e4af4-92ba-4f4f-89d8-f6d4f5501821" providerId="ADAL" clId="{A5DBB2E7-5245-E34B-9D3F-B2997EE571C2}" dt="2023-02-04T14:30:15.786" v="144"/>
+          <ac:spMkLst>
+            <pc:docMk/>
+            <pc:sldMasterMk cId="3100109530" sldId="2147483708"/>
+            <ac:spMk id="2" creationId="{00000000-0000-0000-0000-000000000000}"/>
+          </ac:spMkLst>
+        </pc:spChg>
+        <pc:spChg chg="mod">
+          <ac:chgData name="Bloom PhD, Jesse D" userId="e17e4af4-92ba-4f4f-89d8-f6d4f5501821" providerId="ADAL" clId="{A5DBB2E7-5245-E34B-9D3F-B2997EE571C2}" dt="2023-02-04T14:30:15.786" v="144"/>
+          <ac:spMkLst>
+            <pc:docMk/>
+            <pc:sldMasterMk cId="3100109530" sldId="2147483708"/>
+            <ac:spMk id="3" creationId="{00000000-0000-0000-0000-000000000000}"/>
+          </ac:spMkLst>
+        </pc:spChg>
+        <pc:spChg chg="mod">
+          <ac:chgData name="Bloom PhD, Jesse D" userId="e17e4af4-92ba-4f4f-89d8-f6d4f5501821" providerId="ADAL" clId="{A5DBB2E7-5245-E34B-9D3F-B2997EE571C2}" dt="2023-02-04T14:30:15.786" v="144"/>
+          <ac:spMkLst>
+            <pc:docMk/>
+            <pc:sldMasterMk cId="3100109530" sldId="2147483708"/>
+            <ac:spMk id="4" creationId="{00000000-0000-0000-0000-000000000000}"/>
+          </ac:spMkLst>
+        </pc:spChg>
+        <pc:spChg chg="mod">
+          <ac:chgData name="Bloom PhD, Jesse D" userId="e17e4af4-92ba-4f4f-89d8-f6d4f5501821" providerId="ADAL" clId="{A5DBB2E7-5245-E34B-9D3F-B2997EE571C2}" dt="2023-02-04T14:30:15.786" v="144"/>
+          <ac:spMkLst>
+            <pc:docMk/>
+            <pc:sldMasterMk cId="3100109530" sldId="2147483708"/>
+            <ac:spMk id="5" creationId="{00000000-0000-0000-0000-000000000000}"/>
+          </ac:spMkLst>
+        </pc:spChg>
+        <pc:spChg chg="mod">
+          <ac:chgData name="Bloom PhD, Jesse D" userId="e17e4af4-92ba-4f4f-89d8-f6d4f5501821" providerId="ADAL" clId="{A5DBB2E7-5245-E34B-9D3F-B2997EE571C2}" dt="2023-02-04T14:30:15.786" v="144"/>
+          <ac:spMkLst>
+            <pc:docMk/>
+            <pc:sldMasterMk cId="3100109530" sldId="2147483708"/>
+            <ac:spMk id="6" creationId="{00000000-0000-0000-0000-000000000000}"/>
+          </ac:spMkLst>
+        </pc:spChg>
+        <pc:sldLayoutChg chg="modSp">
+          <pc:chgData name="Bloom PhD, Jesse D" userId="e17e4af4-92ba-4f4f-89d8-f6d4f5501821" providerId="ADAL" clId="{A5DBB2E7-5245-E34B-9D3F-B2997EE571C2}" dt="2023-02-04T14:30:15.786" v="144"/>
+          <pc:sldLayoutMkLst>
+            <pc:docMk/>
+            <pc:sldMasterMk cId="3100109530" sldId="2147483708"/>
+            <pc:sldLayoutMk cId="4052352730" sldId="2147483709"/>
+          </pc:sldLayoutMkLst>
+          <pc:spChg chg="mod">
+            <ac:chgData name="Bloom PhD, Jesse D" userId="e17e4af4-92ba-4f4f-89d8-f6d4f5501821" providerId="ADAL" clId="{A5DBB2E7-5245-E34B-9D3F-B2997EE571C2}" dt="2023-02-04T14:30:15.786" v="144"/>
+            <ac:spMkLst>
+              <pc:docMk/>
+              <pc:sldMasterMk cId="3100109530" sldId="2147483708"/>
+              <pc:sldLayoutMk cId="4052352730" sldId="2147483709"/>
+              <ac:spMk id="2" creationId="{00000000-0000-0000-0000-000000000000}"/>
+            </ac:spMkLst>
+          </pc:spChg>
+          <pc:spChg chg="mod">
+            <ac:chgData name="Bloom PhD, Jesse D" userId="e17e4af4-92ba-4f4f-89d8-f6d4f5501821" providerId="ADAL" clId="{A5DBB2E7-5245-E34B-9D3F-B2997EE571C2}" dt="2023-02-04T14:30:15.786" v="144"/>
+            <ac:spMkLst>
+              <pc:docMk/>
+              <pc:sldMasterMk cId="3100109530" sldId="2147483708"/>
+              <pc:sldLayoutMk cId="4052352730" sldId="2147483709"/>
+              <ac:spMk id="3" creationId="{00000000-0000-0000-0000-000000000000}"/>
+            </ac:spMkLst>
+          </pc:spChg>
+        </pc:sldLayoutChg>
+        <pc:sldLayoutChg chg="modSp">
+          <pc:chgData name="Bloom PhD, Jesse D" userId="e17e4af4-92ba-4f4f-89d8-f6d4f5501821" providerId="ADAL" clId="{A5DBB2E7-5245-E34B-9D3F-B2997EE571C2}" dt="2023-02-04T14:30:15.786" v="144"/>
+          <pc:sldLayoutMkLst>
+            <pc:docMk/>
+            <pc:sldMasterMk cId="3100109530" sldId="2147483708"/>
+            <pc:sldLayoutMk cId="630076982" sldId="2147483711"/>
+          </pc:sldLayoutMkLst>
+          <pc:spChg chg="mod">
+            <ac:chgData name="Bloom PhD, Jesse D" userId="e17e4af4-92ba-4f4f-89d8-f6d4f5501821" providerId="ADAL" clId="{A5DBB2E7-5245-E34B-9D3F-B2997EE571C2}" dt="2023-02-04T14:30:15.786" v="144"/>
+            <ac:spMkLst>
+              <pc:docMk/>
+              <pc:sldMasterMk cId="3100109530" sldId="2147483708"/>
+              <pc:sldLayoutMk cId="630076982" sldId="2147483711"/>
+              <ac:spMk id="2" creationId="{00000000-0000-0000-0000-000000000000}"/>
+            </ac:spMkLst>
+          </pc:spChg>
+          <pc:spChg chg="mod">
+            <ac:chgData name="Bloom PhD, Jesse D" userId="e17e4af4-92ba-4f4f-89d8-f6d4f5501821" providerId="ADAL" clId="{A5DBB2E7-5245-E34B-9D3F-B2997EE571C2}" dt="2023-02-04T14:30:15.786" v="144"/>
+            <ac:spMkLst>
+              <pc:docMk/>
+              <pc:sldMasterMk cId="3100109530" sldId="2147483708"/>
+              <pc:sldLayoutMk cId="630076982" sldId="2147483711"/>
+              <ac:spMk id="3" creationId="{00000000-0000-0000-0000-000000000000}"/>
+            </ac:spMkLst>
+          </pc:spChg>
+        </pc:sldLayoutChg>
+        <pc:sldLayoutChg chg="modSp">
+          <pc:chgData name="Bloom PhD, Jesse D" userId="e17e4af4-92ba-4f4f-89d8-f6d4f5501821" providerId="ADAL" clId="{A5DBB2E7-5245-E34B-9D3F-B2997EE571C2}" dt="2023-02-04T14:30:15.786" v="144"/>
+          <pc:sldLayoutMkLst>
+            <pc:docMk/>
+            <pc:sldMasterMk cId="3100109530" sldId="2147483708"/>
+            <pc:sldLayoutMk cId="1004772474" sldId="2147483712"/>
+          </pc:sldLayoutMkLst>
+          <pc:spChg chg="mod">
+            <ac:chgData name="Bloom PhD, Jesse D" userId="e17e4af4-92ba-4f4f-89d8-f6d4f5501821" providerId="ADAL" clId="{A5DBB2E7-5245-E34B-9D3F-B2997EE571C2}" dt="2023-02-04T14:30:15.786" v="144"/>
+            <ac:spMkLst>
+              <pc:docMk/>
+              <pc:sldMasterMk cId="3100109530" sldId="2147483708"/>
+              <pc:sldLayoutMk cId="1004772474" sldId="2147483712"/>
+              <ac:spMk id="3" creationId="{00000000-0000-0000-0000-000000000000}"/>
+            </ac:spMkLst>
+          </pc:spChg>
+          <pc:spChg chg="mod">
+            <ac:chgData name="Bloom PhD, Jesse D" userId="e17e4af4-92ba-4f4f-89d8-f6d4f5501821" providerId="ADAL" clId="{A5DBB2E7-5245-E34B-9D3F-B2997EE571C2}" dt="2023-02-04T14:30:15.786" v="144"/>
+            <ac:spMkLst>
+              <pc:docMk/>
+              <pc:sldMasterMk cId="3100109530" sldId="2147483708"/>
+              <pc:sldLayoutMk cId="1004772474" sldId="2147483712"/>
+              <ac:spMk id="4" creationId="{00000000-0000-0000-0000-000000000000}"/>
+            </ac:spMkLst>
+          </pc:spChg>
+        </pc:sldLayoutChg>
+        <pc:sldLayoutChg chg="modSp">
+          <pc:chgData name="Bloom PhD, Jesse D" userId="e17e4af4-92ba-4f4f-89d8-f6d4f5501821" providerId="ADAL" clId="{A5DBB2E7-5245-E34B-9D3F-B2997EE571C2}" dt="2023-02-04T14:30:15.786" v="144"/>
+          <pc:sldLayoutMkLst>
+            <pc:docMk/>
+            <pc:sldMasterMk cId="3100109530" sldId="2147483708"/>
+            <pc:sldLayoutMk cId="3902554013" sldId="2147483713"/>
+          </pc:sldLayoutMkLst>
+          <pc:spChg chg="mod">
+            <ac:chgData name="Bloom PhD, Jesse D" userId="e17e4af4-92ba-4f4f-89d8-f6d4f5501821" providerId="ADAL" clId="{A5DBB2E7-5245-E34B-9D3F-B2997EE571C2}" dt="2023-02-04T14:30:15.786" v="144"/>
+            <ac:spMkLst>
+              <pc:docMk/>
+              <pc:sldMasterMk cId="3100109530" sldId="2147483708"/>
+              <pc:sldLayoutMk cId="3902554013" sldId="2147483713"/>
+              <ac:spMk id="2" creationId="{00000000-0000-0000-0000-000000000000}"/>
+            </ac:spMkLst>
+          </pc:spChg>
+          <pc:spChg chg="mod">
+            <ac:chgData name="Bloom PhD, Jesse D" userId="e17e4af4-92ba-4f4f-89d8-f6d4f5501821" providerId="ADAL" clId="{A5DBB2E7-5245-E34B-9D3F-B2997EE571C2}" dt="2023-02-04T14:30:15.786" v="144"/>
+            <ac:spMkLst>
+              <pc:docMk/>
+              <pc:sldMasterMk cId="3100109530" sldId="2147483708"/>
+              <pc:sldLayoutMk cId="3902554013" sldId="2147483713"/>
+              <ac:spMk id="3" creationId="{00000000-0000-0000-0000-000000000000}"/>
+            </ac:spMkLst>
+          </pc:spChg>
+          <pc:spChg chg="mod">
+            <ac:chgData name="Bloom PhD, Jesse D" userId="e17e4af4-92ba-4f4f-89d8-f6d4f5501821" providerId="ADAL" clId="{A5DBB2E7-5245-E34B-9D3F-B2997EE571C2}" dt="2023-02-04T14:30:15.786" v="144"/>
+            <ac:spMkLst>
+              <pc:docMk/>
+              <pc:sldMasterMk cId="3100109530" sldId="2147483708"/>
+              <pc:sldLayoutMk cId="3902554013" sldId="2147483713"/>
+              <ac:spMk id="4" creationId="{00000000-0000-0000-0000-000000000000}"/>
+            </ac:spMkLst>
+          </pc:spChg>
+          <pc:spChg chg="mod">
+            <ac:chgData name="Bloom PhD, Jesse D" userId="e17e4af4-92ba-4f4f-89d8-f6d4f5501821" providerId="ADAL" clId="{A5DBB2E7-5245-E34B-9D3F-B2997EE571C2}" dt="2023-02-04T14:30:15.786" v="144"/>
+            <ac:spMkLst>
+              <pc:docMk/>
+              <pc:sldMasterMk cId="3100109530" sldId="2147483708"/>
+              <pc:sldLayoutMk cId="3902554013" sldId="2147483713"/>
+              <ac:spMk id="5" creationId="{00000000-0000-0000-0000-000000000000}"/>
+            </ac:spMkLst>
+          </pc:spChg>
+          <pc:spChg chg="mod">
+            <ac:chgData name="Bloom PhD, Jesse D" userId="e17e4af4-92ba-4f4f-89d8-f6d4f5501821" providerId="ADAL" clId="{A5DBB2E7-5245-E34B-9D3F-B2997EE571C2}" dt="2023-02-04T14:30:15.786" v="144"/>
+            <ac:spMkLst>
+              <pc:docMk/>
+              <pc:sldMasterMk cId="3100109530" sldId="2147483708"/>
+              <pc:sldLayoutMk cId="3902554013" sldId="2147483713"/>
+              <ac:spMk id="6" creationId="{00000000-0000-0000-0000-000000000000}"/>
+            </ac:spMkLst>
+          </pc:spChg>
+        </pc:sldLayoutChg>
+        <pc:sldLayoutChg chg="modSp">
+          <pc:chgData name="Bloom PhD, Jesse D" userId="e17e4af4-92ba-4f4f-89d8-f6d4f5501821" providerId="ADAL" clId="{A5DBB2E7-5245-E34B-9D3F-B2997EE571C2}" dt="2023-02-04T14:30:15.786" v="144"/>
+          <pc:sldLayoutMkLst>
+            <pc:docMk/>
+            <pc:sldMasterMk cId="3100109530" sldId="2147483708"/>
+            <pc:sldLayoutMk cId="2852783904" sldId="2147483716"/>
+          </pc:sldLayoutMkLst>
+          <pc:spChg chg="mod">
+            <ac:chgData name="Bloom PhD, Jesse D" userId="e17e4af4-92ba-4f4f-89d8-f6d4f5501821" providerId="ADAL" clId="{A5DBB2E7-5245-E34B-9D3F-B2997EE571C2}" dt="2023-02-04T14:30:15.786" v="144"/>
+            <ac:spMkLst>
+              <pc:docMk/>
+              <pc:sldMasterMk cId="3100109530" sldId="2147483708"/>
+              <pc:sldLayoutMk cId="2852783904" sldId="2147483716"/>
+              <ac:spMk id="2" creationId="{00000000-0000-0000-0000-000000000000}"/>
+            </ac:spMkLst>
+          </pc:spChg>
+          <pc:spChg chg="mod">
+            <ac:chgData name="Bloom PhD, Jesse D" userId="e17e4af4-92ba-4f4f-89d8-f6d4f5501821" providerId="ADAL" clId="{A5DBB2E7-5245-E34B-9D3F-B2997EE571C2}" dt="2023-02-04T14:30:15.786" v="144"/>
+            <ac:spMkLst>
+              <pc:docMk/>
+              <pc:sldMasterMk cId="3100109530" sldId="2147483708"/>
+              <pc:sldLayoutMk cId="2852783904" sldId="2147483716"/>
+              <ac:spMk id="3" creationId="{00000000-0000-0000-0000-000000000000}"/>
+            </ac:spMkLst>
+          </pc:spChg>
+          <pc:spChg chg="mod">
+            <ac:chgData name="Bloom PhD, Jesse D" userId="e17e4af4-92ba-4f4f-89d8-f6d4f5501821" providerId="ADAL" clId="{A5DBB2E7-5245-E34B-9D3F-B2997EE571C2}" dt="2023-02-04T14:30:15.786" v="144"/>
+            <ac:spMkLst>
+              <pc:docMk/>
+              <pc:sldMasterMk cId="3100109530" sldId="2147483708"/>
+              <pc:sldLayoutMk cId="2852783904" sldId="2147483716"/>
+              <ac:spMk id="4" creationId="{00000000-0000-0000-0000-000000000000}"/>
+            </ac:spMkLst>
+          </pc:spChg>
+        </pc:sldLayoutChg>
+        <pc:sldLayoutChg chg="modSp">
+          <pc:chgData name="Bloom PhD, Jesse D" userId="e17e4af4-92ba-4f4f-89d8-f6d4f5501821" providerId="ADAL" clId="{A5DBB2E7-5245-E34B-9D3F-B2997EE571C2}" dt="2023-02-04T14:30:15.786" v="144"/>
+          <pc:sldLayoutMkLst>
+            <pc:docMk/>
+            <pc:sldMasterMk cId="3100109530" sldId="2147483708"/>
+            <pc:sldLayoutMk cId="2579469618" sldId="2147483717"/>
+          </pc:sldLayoutMkLst>
+          <pc:spChg chg="mod">
+            <ac:chgData name="Bloom PhD, Jesse D" userId="e17e4af4-92ba-4f4f-89d8-f6d4f5501821" providerId="ADAL" clId="{A5DBB2E7-5245-E34B-9D3F-B2997EE571C2}" dt="2023-02-04T14:30:15.786" v="144"/>
+            <ac:spMkLst>
+              <pc:docMk/>
+              <pc:sldMasterMk cId="3100109530" sldId="2147483708"/>
+              <pc:sldLayoutMk cId="2579469618" sldId="2147483717"/>
+              <ac:spMk id="2" creationId="{00000000-0000-0000-0000-000000000000}"/>
+            </ac:spMkLst>
+          </pc:spChg>
+          <pc:spChg chg="mod">
+            <ac:chgData name="Bloom PhD, Jesse D" userId="e17e4af4-92ba-4f4f-89d8-f6d4f5501821" providerId="ADAL" clId="{A5DBB2E7-5245-E34B-9D3F-B2997EE571C2}" dt="2023-02-04T14:30:15.786" v="144"/>
+            <ac:spMkLst>
+              <pc:docMk/>
+              <pc:sldMasterMk cId="3100109530" sldId="2147483708"/>
+              <pc:sldLayoutMk cId="2579469618" sldId="2147483717"/>
+              <ac:spMk id="3" creationId="{00000000-0000-0000-0000-000000000000}"/>
+            </ac:spMkLst>
+          </pc:spChg>
+          <pc:spChg chg="mod">
+            <ac:chgData name="Bloom PhD, Jesse D" userId="e17e4af4-92ba-4f4f-89d8-f6d4f5501821" providerId="ADAL" clId="{A5DBB2E7-5245-E34B-9D3F-B2997EE571C2}" dt="2023-02-04T14:30:15.786" v="144"/>
+            <ac:spMkLst>
+              <pc:docMk/>
+              <pc:sldMasterMk cId="3100109530" sldId="2147483708"/>
+              <pc:sldLayoutMk cId="2579469618" sldId="2147483717"/>
+              <ac:spMk id="4" creationId="{00000000-0000-0000-0000-000000000000}"/>
+            </ac:spMkLst>
+          </pc:spChg>
+        </pc:sldLayoutChg>
+        <pc:sldLayoutChg chg="modSp">
+          <pc:chgData name="Bloom PhD, Jesse D" userId="e17e4af4-92ba-4f4f-89d8-f6d4f5501821" providerId="ADAL" clId="{A5DBB2E7-5245-E34B-9D3F-B2997EE571C2}" dt="2023-02-04T14:30:15.786" v="144"/>
+          <pc:sldLayoutMkLst>
+            <pc:docMk/>
+            <pc:sldMasterMk cId="3100109530" sldId="2147483708"/>
+            <pc:sldLayoutMk cId="2701495120" sldId="2147483719"/>
+          </pc:sldLayoutMkLst>
+          <pc:spChg chg="mod">
+            <ac:chgData name="Bloom PhD, Jesse D" userId="e17e4af4-92ba-4f4f-89d8-f6d4f5501821" providerId="ADAL" clId="{A5DBB2E7-5245-E34B-9D3F-B2997EE571C2}" dt="2023-02-04T14:30:15.786" v="144"/>
+            <ac:spMkLst>
+              <pc:docMk/>
+              <pc:sldMasterMk cId="3100109530" sldId="2147483708"/>
+              <pc:sldLayoutMk cId="2701495120" sldId="2147483719"/>
+              <ac:spMk id="2" creationId="{00000000-0000-0000-0000-000000000000}"/>
+            </ac:spMkLst>
+          </pc:spChg>
+          <pc:spChg chg="mod">
+            <ac:chgData name="Bloom PhD, Jesse D" userId="e17e4af4-92ba-4f4f-89d8-f6d4f5501821" providerId="ADAL" clId="{A5DBB2E7-5245-E34B-9D3F-B2997EE571C2}" dt="2023-02-04T14:30:15.786" v="144"/>
+            <ac:spMkLst>
+              <pc:docMk/>
+              <pc:sldMasterMk cId="3100109530" sldId="2147483708"/>
+              <pc:sldLayoutMk cId="2701495120" sldId="2147483719"/>
+              <ac:spMk id="3" creationId="{00000000-0000-0000-0000-000000000000}"/>
+            </ac:spMkLst>
+          </pc:spChg>
+        </pc:sldLayoutChg>
+      </pc:sldMasterChg>
+    </pc:docChg>
+  </pc:docChgLst>
+</pc:chgInfo>
 </file>
 
 <file path=ppt/slideLayouts/slideLayout1.xml><?xml version="1.0" encoding="utf-8"?>
@@ -136,8 +910,8 @@
         </p:nvSpPr>
         <p:spPr>
           <a:xfrm>
-            <a:off x="480060" y="1421660"/>
-            <a:ext cx="5440680" cy="3024293"/>
+            <a:off x="480060" y="1571308"/>
+            <a:ext cx="5440680" cy="3342640"/>
           </a:xfrm>
         </p:spPr>
         <p:txBody>
@@ -168,8 +942,8 @@
         </p:nvSpPr>
         <p:spPr>
           <a:xfrm>
-            <a:off x="800100" y="4562581"/>
-            <a:ext cx="4800600" cy="2097299"/>
+            <a:off x="800100" y="5042853"/>
+            <a:ext cx="4800600" cy="2318067"/>
           </a:xfrm>
         </p:spPr>
         <p:txBody>
@@ -238,7 +1012,7 @@
           <a:p>
             <a:fld id="{D9C8106E-4C12-7F49-BE1B-9EA45A346207}" type="datetimeFigureOut">
               <a:rPr lang="en-US" smtClean="0"/>
-              <a:t>11/18/22</a:t>
+              <a:t>2/4/23</a:t>
             </a:fld>
             <a:endParaRPr lang="en-US"/>
           </a:p>
@@ -289,7 +1063,7 @@
     </p:spTree>
     <p:extLst>
       <p:ext uri="{BB962C8B-B14F-4D97-AF65-F5344CB8AC3E}">
-        <p14:creationId xmlns:p14="http://schemas.microsoft.com/office/powerpoint/2010/main" val="2936179978"/>
+        <p14:creationId xmlns:p14="http://schemas.microsoft.com/office/powerpoint/2010/main" val="3094292232"/>
       </p:ext>
     </p:extLst>
   </p:cSld>
@@ -408,7 +1182,7 @@
           <a:p>
             <a:fld id="{D9C8106E-4C12-7F49-BE1B-9EA45A346207}" type="datetimeFigureOut">
               <a:rPr lang="en-US" smtClean="0"/>
-              <a:t>11/18/22</a:t>
+              <a:t>2/4/23</a:t>
             </a:fld>
             <a:endParaRPr lang="en-US"/>
           </a:p>
@@ -459,7 +1233,7 @@
     </p:spTree>
     <p:extLst>
       <p:ext uri="{BB962C8B-B14F-4D97-AF65-F5344CB8AC3E}">
-        <p14:creationId xmlns:p14="http://schemas.microsoft.com/office/powerpoint/2010/main" val="1599202091"/>
+        <p14:creationId xmlns:p14="http://schemas.microsoft.com/office/powerpoint/2010/main" val="868203357"/>
       </p:ext>
     </p:extLst>
   </p:cSld>
@@ -498,8 +1272,8 @@
         </p:nvSpPr>
         <p:spPr>
           <a:xfrm>
-            <a:off x="4580573" y="462492"/>
-            <a:ext cx="1380173" cy="7361661"/>
+            <a:off x="4580573" y="511175"/>
+            <a:ext cx="1380173" cy="8136573"/>
           </a:xfrm>
         </p:spPr>
         <p:txBody>
@@ -526,8 +1300,8 @@
         </p:nvSpPr>
         <p:spPr>
           <a:xfrm>
-            <a:off x="440055" y="462492"/>
-            <a:ext cx="4060508" cy="7361661"/>
+            <a:off x="440055" y="511175"/>
+            <a:ext cx="4060508" cy="8136573"/>
           </a:xfrm>
         </p:spPr>
         <p:txBody>
@@ -588,7 +1362,7 @@
           <a:p>
             <a:fld id="{D9C8106E-4C12-7F49-BE1B-9EA45A346207}" type="datetimeFigureOut">
               <a:rPr lang="en-US" smtClean="0"/>
-              <a:t>11/18/22</a:t>
+              <a:t>2/4/23</a:t>
             </a:fld>
             <a:endParaRPr lang="en-US"/>
           </a:p>
@@ -639,7 +1413,7 @@
     </p:spTree>
     <p:extLst>
       <p:ext uri="{BB962C8B-B14F-4D97-AF65-F5344CB8AC3E}">
-        <p14:creationId xmlns:p14="http://schemas.microsoft.com/office/powerpoint/2010/main" val="29501061"/>
+        <p14:creationId xmlns:p14="http://schemas.microsoft.com/office/powerpoint/2010/main" val="1166625702"/>
       </p:ext>
     </p:extLst>
   </p:cSld>
@@ -758,7 +1532,7 @@
           <a:p>
             <a:fld id="{D9C8106E-4C12-7F49-BE1B-9EA45A346207}" type="datetimeFigureOut">
               <a:rPr lang="en-US" smtClean="0"/>
-              <a:t>11/18/22</a:t>
+              <a:t>2/4/23</a:t>
             </a:fld>
             <a:endParaRPr lang="en-US"/>
           </a:p>
@@ -809,7 +1583,7 @@
     </p:spTree>
     <p:extLst>
       <p:ext uri="{BB962C8B-B14F-4D97-AF65-F5344CB8AC3E}">
-        <p14:creationId xmlns:p14="http://schemas.microsoft.com/office/powerpoint/2010/main" val="3561013604"/>
+        <p14:creationId xmlns:p14="http://schemas.microsoft.com/office/powerpoint/2010/main" val="92868227"/>
       </p:ext>
     </p:extLst>
   </p:cSld>
@@ -848,8 +1622,8 @@
         </p:nvSpPr>
         <p:spPr>
           <a:xfrm>
-            <a:off x="436722" y="2165670"/>
-            <a:ext cx="5520690" cy="3613467"/>
+            <a:off x="436722" y="2393635"/>
+            <a:ext cx="5520690" cy="3993832"/>
           </a:xfrm>
         </p:spPr>
         <p:txBody>
@@ -880,8 +1654,8 @@
         </p:nvSpPr>
         <p:spPr>
           <a:xfrm>
-            <a:off x="436722" y="5813322"/>
-            <a:ext cx="5520690" cy="1900237"/>
+            <a:off x="436722" y="6425250"/>
+            <a:ext cx="5520690" cy="2100262"/>
           </a:xfrm>
         </p:spPr>
         <p:txBody>
@@ -1002,7 +1776,7 @@
           <a:p>
             <a:fld id="{D9C8106E-4C12-7F49-BE1B-9EA45A346207}" type="datetimeFigureOut">
               <a:rPr lang="en-US" smtClean="0"/>
-              <a:t>11/18/22</a:t>
+              <a:t>2/4/23</a:t>
             </a:fld>
             <a:endParaRPr lang="en-US"/>
           </a:p>
@@ -1053,7 +1827,7 @@
     </p:spTree>
     <p:extLst>
       <p:ext uri="{BB962C8B-B14F-4D97-AF65-F5344CB8AC3E}">
-        <p14:creationId xmlns:p14="http://schemas.microsoft.com/office/powerpoint/2010/main" val="3998121419"/>
+        <p14:creationId xmlns:p14="http://schemas.microsoft.com/office/powerpoint/2010/main" val="2927128719"/>
       </p:ext>
     </p:extLst>
   </p:cSld>
@@ -1115,8 +1889,8 @@
         </p:nvSpPr>
         <p:spPr>
           <a:xfrm>
-            <a:off x="440055" y="2312458"/>
-            <a:ext cx="2720340" cy="5511695"/>
+            <a:off x="440055" y="2555875"/>
+            <a:ext cx="2720340" cy="6091873"/>
           </a:xfrm>
         </p:spPr>
         <p:txBody>
@@ -1172,8 +1946,8 @@
         </p:nvSpPr>
         <p:spPr>
           <a:xfrm>
-            <a:off x="3240405" y="2312458"/>
-            <a:ext cx="2720340" cy="5511695"/>
+            <a:off x="3240405" y="2555875"/>
+            <a:ext cx="2720340" cy="6091873"/>
           </a:xfrm>
         </p:spPr>
         <p:txBody>
@@ -1234,7 +2008,7 @@
           <a:p>
             <a:fld id="{D9C8106E-4C12-7F49-BE1B-9EA45A346207}" type="datetimeFigureOut">
               <a:rPr lang="en-US" smtClean="0"/>
-              <a:t>11/18/22</a:t>
+              <a:t>2/4/23</a:t>
             </a:fld>
             <a:endParaRPr lang="en-US"/>
           </a:p>
@@ -1285,7 +2059,7 @@
     </p:spTree>
     <p:extLst>
       <p:ext uri="{BB962C8B-B14F-4D97-AF65-F5344CB8AC3E}">
-        <p14:creationId xmlns:p14="http://schemas.microsoft.com/office/powerpoint/2010/main" val="1682492879"/>
+        <p14:creationId xmlns:p14="http://schemas.microsoft.com/office/powerpoint/2010/main" val="928006469"/>
       </p:ext>
     </p:extLst>
   </p:cSld>
@@ -1324,8 +2098,8 @@
         </p:nvSpPr>
         <p:spPr>
           <a:xfrm>
-            <a:off x="440889" y="462494"/>
-            <a:ext cx="5520690" cy="1679046"/>
+            <a:off x="440889" y="511177"/>
+            <a:ext cx="5520690" cy="1855788"/>
           </a:xfrm>
         </p:spPr>
         <p:txBody>
@@ -1352,8 +2126,8 @@
         </p:nvSpPr>
         <p:spPr>
           <a:xfrm>
-            <a:off x="440889" y="2129473"/>
-            <a:ext cx="2707838" cy="1043622"/>
+            <a:off x="440889" y="2353628"/>
+            <a:ext cx="2707838" cy="1153477"/>
           </a:xfrm>
         </p:spPr>
         <p:txBody>
@@ -1417,8 +2191,8 @@
         </p:nvSpPr>
         <p:spPr>
           <a:xfrm>
-            <a:off x="440889" y="3173095"/>
-            <a:ext cx="2707838" cy="4667145"/>
+            <a:off x="440889" y="3507105"/>
+            <a:ext cx="2707838" cy="5158423"/>
           </a:xfrm>
         </p:spPr>
         <p:txBody>
@@ -1474,8 +2248,8 @@
         </p:nvSpPr>
         <p:spPr>
           <a:xfrm>
-            <a:off x="3240405" y="2129473"/>
-            <a:ext cx="2721174" cy="1043622"/>
+            <a:off x="3240405" y="2353628"/>
+            <a:ext cx="2721174" cy="1153477"/>
           </a:xfrm>
         </p:spPr>
         <p:txBody>
@@ -1539,8 +2313,8 @@
         </p:nvSpPr>
         <p:spPr>
           <a:xfrm>
-            <a:off x="3240405" y="3173095"/>
-            <a:ext cx="2721174" cy="4667145"/>
+            <a:off x="3240405" y="3507105"/>
+            <a:ext cx="2721174" cy="5158423"/>
           </a:xfrm>
         </p:spPr>
         <p:txBody>
@@ -1601,7 +2375,7 @@
           <a:p>
             <a:fld id="{D9C8106E-4C12-7F49-BE1B-9EA45A346207}" type="datetimeFigureOut">
               <a:rPr lang="en-US" smtClean="0"/>
-              <a:t>11/18/22</a:t>
+              <a:t>2/4/23</a:t>
             </a:fld>
             <a:endParaRPr lang="en-US"/>
           </a:p>
@@ -1652,7 +2426,7 @@
     </p:spTree>
     <p:extLst>
       <p:ext uri="{BB962C8B-B14F-4D97-AF65-F5344CB8AC3E}">
-        <p14:creationId xmlns:p14="http://schemas.microsoft.com/office/powerpoint/2010/main" val="3628088772"/>
+        <p14:creationId xmlns:p14="http://schemas.microsoft.com/office/powerpoint/2010/main" val="829894989"/>
       </p:ext>
     </p:extLst>
   </p:cSld>
@@ -1719,7 +2493,7 @@
           <a:p>
             <a:fld id="{D9C8106E-4C12-7F49-BE1B-9EA45A346207}" type="datetimeFigureOut">
               <a:rPr lang="en-US" smtClean="0"/>
-              <a:t>11/18/22</a:t>
+              <a:t>2/4/23</a:t>
             </a:fld>
             <a:endParaRPr lang="en-US"/>
           </a:p>
@@ -1770,7 +2544,7 @@
     </p:spTree>
     <p:extLst>
       <p:ext uri="{BB962C8B-B14F-4D97-AF65-F5344CB8AC3E}">
-        <p14:creationId xmlns:p14="http://schemas.microsoft.com/office/powerpoint/2010/main" val="3650180007"/>
+        <p14:creationId xmlns:p14="http://schemas.microsoft.com/office/powerpoint/2010/main" val="3393177049"/>
       </p:ext>
     </p:extLst>
   </p:cSld>
@@ -1814,7 +2588,7 @@
           <a:p>
             <a:fld id="{D9C8106E-4C12-7F49-BE1B-9EA45A346207}" type="datetimeFigureOut">
               <a:rPr lang="en-US" smtClean="0"/>
-              <a:t>11/18/22</a:t>
+              <a:t>2/4/23</a:t>
             </a:fld>
             <a:endParaRPr lang="en-US"/>
           </a:p>
@@ -1865,7 +2639,7 @@
     </p:spTree>
     <p:extLst>
       <p:ext uri="{BB962C8B-B14F-4D97-AF65-F5344CB8AC3E}">
-        <p14:creationId xmlns:p14="http://schemas.microsoft.com/office/powerpoint/2010/main" val="1315562848"/>
+        <p14:creationId xmlns:p14="http://schemas.microsoft.com/office/powerpoint/2010/main" val="3791068070"/>
       </p:ext>
     </p:extLst>
   </p:cSld>
@@ -1904,8 +2678,8 @@
         </p:nvSpPr>
         <p:spPr>
           <a:xfrm>
-            <a:off x="440889" y="579120"/>
-            <a:ext cx="2064425" cy="2026920"/>
+            <a:off x="440889" y="640080"/>
+            <a:ext cx="2064425" cy="2240280"/>
           </a:xfrm>
         </p:spPr>
         <p:txBody>
@@ -1936,8 +2710,8 @@
         </p:nvSpPr>
         <p:spPr>
           <a:xfrm>
-            <a:off x="2721174" y="1250740"/>
-            <a:ext cx="3240405" cy="6173258"/>
+            <a:off x="2721174" y="1382397"/>
+            <a:ext cx="3240405" cy="6823075"/>
           </a:xfrm>
         </p:spPr>
         <p:txBody>
@@ -2021,8 +2795,8 @@
         </p:nvSpPr>
         <p:spPr>
           <a:xfrm>
-            <a:off x="440889" y="2606040"/>
-            <a:ext cx="2064425" cy="4828011"/>
+            <a:off x="440889" y="2880360"/>
+            <a:ext cx="2064425" cy="5336223"/>
           </a:xfrm>
         </p:spPr>
         <p:txBody>
@@ -2091,7 +2865,7 @@
           <a:p>
             <a:fld id="{D9C8106E-4C12-7F49-BE1B-9EA45A346207}" type="datetimeFigureOut">
               <a:rPr lang="en-US" smtClean="0"/>
-              <a:t>11/18/22</a:t>
+              <a:t>2/4/23</a:t>
             </a:fld>
             <a:endParaRPr lang="en-US"/>
           </a:p>
@@ -2142,7 +2916,7 @@
     </p:spTree>
     <p:extLst>
       <p:ext uri="{BB962C8B-B14F-4D97-AF65-F5344CB8AC3E}">
-        <p14:creationId xmlns:p14="http://schemas.microsoft.com/office/powerpoint/2010/main" val="436875253"/>
+        <p14:creationId xmlns:p14="http://schemas.microsoft.com/office/powerpoint/2010/main" val="3077807355"/>
       </p:ext>
     </p:extLst>
   </p:cSld>
@@ -2181,8 +2955,8 @@
         </p:nvSpPr>
         <p:spPr>
           <a:xfrm>
-            <a:off x="440889" y="579120"/>
-            <a:ext cx="2064425" cy="2026920"/>
+            <a:off x="440889" y="640080"/>
+            <a:ext cx="2064425" cy="2240280"/>
           </a:xfrm>
         </p:spPr>
         <p:txBody>
@@ -2213,8 +2987,8 @@
         </p:nvSpPr>
         <p:spPr>
           <a:xfrm>
-            <a:off x="2721174" y="1250740"/>
-            <a:ext cx="3240405" cy="6173258"/>
+            <a:off x="2721174" y="1382397"/>
+            <a:ext cx="3240405" cy="6823075"/>
           </a:xfrm>
         </p:spPr>
         <p:txBody>
@@ -2278,8 +3052,8 @@
         </p:nvSpPr>
         <p:spPr>
           <a:xfrm>
-            <a:off x="440889" y="2606040"/>
-            <a:ext cx="2064425" cy="4828011"/>
+            <a:off x="440889" y="2880360"/>
+            <a:ext cx="2064425" cy="5336223"/>
           </a:xfrm>
         </p:spPr>
         <p:txBody>
@@ -2348,7 +3122,7 @@
           <a:p>
             <a:fld id="{D9C8106E-4C12-7F49-BE1B-9EA45A346207}" type="datetimeFigureOut">
               <a:rPr lang="en-US" smtClean="0"/>
-              <a:t>11/18/22</a:t>
+              <a:t>2/4/23</a:t>
             </a:fld>
             <a:endParaRPr lang="en-US"/>
           </a:p>
@@ -2399,7 +3173,7 @@
     </p:spTree>
     <p:extLst>
       <p:ext uri="{BB962C8B-B14F-4D97-AF65-F5344CB8AC3E}">
-        <p14:creationId xmlns:p14="http://schemas.microsoft.com/office/powerpoint/2010/main" val="1896331358"/>
+        <p14:creationId xmlns:p14="http://schemas.microsoft.com/office/powerpoint/2010/main" val="1725876466"/>
       </p:ext>
     </p:extLst>
   </p:cSld>
@@ -2443,8 +3217,8 @@
         </p:nvSpPr>
         <p:spPr>
           <a:xfrm>
-            <a:off x="440055" y="462494"/>
-            <a:ext cx="5520690" cy="1679046"/>
+            <a:off x="440055" y="511177"/>
+            <a:ext cx="5520690" cy="1855788"/>
           </a:xfrm>
           <a:prstGeom prst="rect">
             <a:avLst/>
@@ -2476,8 +3250,8 @@
         </p:nvSpPr>
         <p:spPr>
           <a:xfrm>
-            <a:off x="440055" y="2312458"/>
-            <a:ext cx="5520690" cy="5511695"/>
+            <a:off x="440055" y="2555875"/>
+            <a:ext cx="5520690" cy="6091873"/>
           </a:xfrm>
           <a:prstGeom prst="rect">
             <a:avLst/>
@@ -2538,8 +3312,8 @@
         </p:nvSpPr>
         <p:spPr>
           <a:xfrm>
-            <a:off x="440055" y="8051378"/>
-            <a:ext cx="1440180" cy="462492"/>
+            <a:off x="440055" y="8898892"/>
+            <a:ext cx="1440180" cy="511175"/>
           </a:xfrm>
           <a:prstGeom prst="rect">
             <a:avLst/>
@@ -2561,7 +3335,7 @@
           <a:p>
             <a:fld id="{D9C8106E-4C12-7F49-BE1B-9EA45A346207}" type="datetimeFigureOut">
               <a:rPr lang="en-US" smtClean="0"/>
-              <a:t>11/18/22</a:t>
+              <a:t>2/4/23</a:t>
             </a:fld>
             <a:endParaRPr lang="en-US"/>
           </a:p>
@@ -2579,8 +3353,8 @@
         </p:nvSpPr>
         <p:spPr>
           <a:xfrm>
-            <a:off x="2120265" y="8051378"/>
-            <a:ext cx="2160270" cy="462492"/>
+            <a:off x="2120265" y="8898892"/>
+            <a:ext cx="2160270" cy="511175"/>
           </a:xfrm>
           <a:prstGeom prst="rect">
             <a:avLst/>
@@ -2616,8 +3390,8 @@
         </p:nvSpPr>
         <p:spPr>
           <a:xfrm>
-            <a:off x="4520565" y="8051378"/>
-            <a:ext cx="1440180" cy="462492"/>
+            <a:off x="4520565" y="8898892"/>
+            <a:ext cx="1440180" cy="511175"/>
           </a:xfrm>
           <a:prstGeom prst="rect">
             <a:avLst/>
@@ -2648,23 +3422,23 @@
     </p:spTree>
     <p:extLst>
       <p:ext uri="{BB962C8B-B14F-4D97-AF65-F5344CB8AC3E}">
-        <p14:creationId xmlns:p14="http://schemas.microsoft.com/office/powerpoint/2010/main" val="3615336018"/>
+        <p14:creationId xmlns:p14="http://schemas.microsoft.com/office/powerpoint/2010/main" val="1150963775"/>
       </p:ext>
     </p:extLst>
   </p:cSld>
   <p:clrMap bg1="lt1" tx1="dk1" bg2="lt2" tx2="dk2" accent1="accent1" accent2="accent2" accent3="accent3" accent4="accent4" accent5="accent5" accent6="accent6" hlink="hlink" folHlink="folHlink"/>
   <p:sldLayoutIdLst>
-    <p:sldLayoutId id="2147483697" r:id="rId1"/>
-    <p:sldLayoutId id="2147483698" r:id="rId2"/>
-    <p:sldLayoutId id="2147483699" r:id="rId3"/>
-    <p:sldLayoutId id="2147483700" r:id="rId4"/>
-    <p:sldLayoutId id="2147483701" r:id="rId5"/>
-    <p:sldLayoutId id="2147483702" r:id="rId6"/>
-    <p:sldLayoutId id="2147483703" r:id="rId7"/>
-    <p:sldLayoutId id="2147483704" r:id="rId8"/>
-    <p:sldLayoutId id="2147483705" r:id="rId9"/>
-    <p:sldLayoutId id="2147483706" r:id="rId10"/>
-    <p:sldLayoutId id="2147483707" r:id="rId11"/>
+    <p:sldLayoutId id="2147483721" r:id="rId1"/>
+    <p:sldLayoutId id="2147483722" r:id="rId2"/>
+    <p:sldLayoutId id="2147483723" r:id="rId3"/>
+    <p:sldLayoutId id="2147483724" r:id="rId4"/>
+    <p:sldLayoutId id="2147483725" r:id="rId5"/>
+    <p:sldLayoutId id="2147483726" r:id="rId6"/>
+    <p:sldLayoutId id="2147483727" r:id="rId7"/>
+    <p:sldLayoutId id="2147483728" r:id="rId8"/>
+    <p:sldLayoutId id="2147483729" r:id="rId9"/>
+    <p:sldLayoutId id="2147483730" r:id="rId10"/>
+    <p:sldLayoutId id="2147483731" r:id="rId11"/>
   </p:sldLayoutIdLst>
   <p:txStyles>
     <p:titleStyle>
@@ -2968,10 +3742,10 @@
       </p:grpSpPr>
       <p:pic>
         <p:nvPicPr>
-          <p:cNvPr id="21" name="Picture 20" descr="Chart, scatter chart&#10;&#10;Description automatically generated">
+          <p:cNvPr id="12" name="Graphic 11">
             <a:extLst>
               <a:ext uri="{FF2B5EF4-FFF2-40B4-BE49-F238E27FC236}">
-                <a16:creationId xmlns:a16="http://schemas.microsoft.com/office/drawing/2014/main" id="{8F5EA54D-7DC8-F339-1482-2FCDCBB36693}"/>
+                <a16:creationId xmlns:a16="http://schemas.microsoft.com/office/drawing/2014/main" id="{7D17704C-BA97-98F5-DC45-AED0DBEAB958}"/>
               </a:ext>
             </a:extLst>
           </p:cNvPr>
@@ -2981,7 +3755,43 @@
           <p:nvPr/>
         </p:nvPicPr>
         <p:blipFill>
-          <a:blip r:embed="rId2"/>
+          <a:blip r:embed="rId2">
+            <a:extLst>
+              <a:ext uri="{96DAC541-7B7A-43D3-8B79-37D633B846F1}">
+                <asvg:svgBlip xmlns:asvg="http://schemas.microsoft.com/office/drawing/2016/SVG/main" r:embed="rId3"/>
+              </a:ext>
+            </a:extLst>
+          </a:blip>
+          <a:stretch>
+            <a:fillRect/>
+          </a:stretch>
+        </p:blipFill>
+        <p:spPr>
+          <a:xfrm>
+            <a:off x="0" y="6019555"/>
+            <a:ext cx="5539763" cy="3470133"/>
+          </a:xfrm>
+          <a:prstGeom prst="rect">
+            <a:avLst/>
+          </a:prstGeom>
+        </p:spPr>
+      </p:pic>
+      <p:pic>
+        <p:nvPicPr>
+          <p:cNvPr id="13" name="Picture 12" descr="Chart, scatter chart&#10;&#10;Description automatically generated">
+            <a:extLst>
+              <a:ext uri="{FF2B5EF4-FFF2-40B4-BE49-F238E27FC236}">
+                <a16:creationId xmlns:a16="http://schemas.microsoft.com/office/drawing/2014/main" id="{FAD14122-3D69-5E63-4E32-B250DB6BD7AF}"/>
+              </a:ext>
+            </a:extLst>
+          </p:cNvPr>
+          <p:cNvPicPr>
+            <a:picLocks noChangeAspect="1"/>
+          </p:cNvPicPr>
+          <p:nvPr/>
+        </p:nvPicPr>
+        <p:blipFill>
+          <a:blip r:embed="rId4"/>
           <a:stretch>
             <a:fillRect/>
           </a:stretch>
@@ -2998,10 +3808,10 @@
       </p:pic>
       <p:sp>
         <p:nvSpPr>
-          <p:cNvPr id="22" name="TextBox 21">
+          <p:cNvPr id="14" name="TextBox 13">
             <a:extLst>
               <a:ext uri="{FF2B5EF4-FFF2-40B4-BE49-F238E27FC236}">
-                <a16:creationId xmlns:a16="http://schemas.microsoft.com/office/drawing/2014/main" id="{64FB362D-D69E-F5D5-D4F9-CA7FE4106302}"/>
+                <a16:creationId xmlns:a16="http://schemas.microsoft.com/office/drawing/2014/main" id="{FDEE8D28-1497-2F96-8E39-EDDE729930E9}"/>
               </a:ext>
             </a:extLst>
           </p:cNvPr>
@@ -3039,10 +3849,10 @@
       </p:sp>
       <p:sp>
         <p:nvSpPr>
-          <p:cNvPr id="23" name="TextBox 22">
+          <p:cNvPr id="15" name="TextBox 14">
             <a:extLst>
               <a:ext uri="{FF2B5EF4-FFF2-40B4-BE49-F238E27FC236}">
-                <a16:creationId xmlns:a16="http://schemas.microsoft.com/office/drawing/2014/main" id="{B31E2236-E698-2E98-7FC6-A0E7503AD06D}"/>
+                <a16:creationId xmlns:a16="http://schemas.microsoft.com/office/drawing/2014/main" id="{D7763EE5-86B5-1C08-C335-B5DCF5FA049F}"/>
               </a:ext>
             </a:extLst>
           </p:cNvPr>
@@ -3080,109 +3890,17 @@
                 <a:latin typeface="Arial" panose="020B0604020202020204" pitchFamily="34" charset="0"/>
                 <a:cs typeface="Arial" panose="020B0604020202020204" pitchFamily="34" charset="0"/>
               </a:rPr>
-              <a:t> frequencies at 4-fold degenerate sites</a:t>
-            </a:r>
-          </a:p>
-        </p:txBody>
-      </p:sp>
-      <p:grpSp>
-        <p:nvGrpSpPr>
-          <p:cNvPr id="24" name="Group 23">
+              <a:t> empirical frequencies at 4-fold degenerate sites</a:t>
+            </a:r>
+          </a:p>
+        </p:txBody>
+      </p:sp>
+      <p:sp>
+        <p:nvSpPr>
+          <p:cNvPr id="16" name="TextBox 15">
             <a:extLst>
               <a:ext uri="{FF2B5EF4-FFF2-40B4-BE49-F238E27FC236}">
-                <a16:creationId xmlns:a16="http://schemas.microsoft.com/office/drawing/2014/main" id="{830858C5-0C1D-5F2D-E231-7D7D07423A8C}"/>
-              </a:ext>
-            </a:extLst>
-          </p:cNvPr>
-          <p:cNvGrpSpPr/>
-          <p:nvPr/>
-        </p:nvGrpSpPr>
-        <p:grpSpPr>
-          <a:xfrm>
-            <a:off x="876300" y="5784602"/>
-            <a:ext cx="5092701" cy="2729556"/>
-            <a:chOff x="876300" y="6104229"/>
-            <a:chExt cx="5092701" cy="2729556"/>
-          </a:xfrm>
-        </p:grpSpPr>
-        <p:pic>
-          <p:nvPicPr>
-            <p:cNvPr id="25" name="Picture 24">
-              <a:extLst>
-                <a:ext uri="{FF2B5EF4-FFF2-40B4-BE49-F238E27FC236}">
-                  <a16:creationId xmlns:a16="http://schemas.microsoft.com/office/drawing/2014/main" id="{11951797-F058-8383-C10C-E03FC89932ED}"/>
-                </a:ext>
-              </a:extLst>
-            </p:cNvPr>
-            <p:cNvPicPr>
-              <a:picLocks noChangeAspect="1"/>
-            </p:cNvPicPr>
-            <p:nvPr/>
-          </p:nvPicPr>
-          <p:blipFill>
-            <a:blip r:embed="rId3"/>
-            <a:stretch>
-              <a:fillRect/>
-            </a:stretch>
-          </p:blipFill>
-          <p:spPr>
-            <a:xfrm>
-              <a:off x="876300" y="6419274"/>
-              <a:ext cx="4648200" cy="2414511"/>
-            </a:xfrm>
-            <a:prstGeom prst="rect">
-              <a:avLst/>
-            </a:prstGeom>
-          </p:spPr>
-        </p:pic>
-        <p:sp>
-          <p:nvSpPr>
-            <p:cNvPr id="26" name="TextBox 25">
-              <a:extLst>
-                <a:ext uri="{FF2B5EF4-FFF2-40B4-BE49-F238E27FC236}">
-                  <a16:creationId xmlns:a16="http://schemas.microsoft.com/office/drawing/2014/main" id="{0F4A86FA-EC72-A3C8-0AE1-BE0B0E67FA28}"/>
-                </a:ext>
-              </a:extLst>
-            </p:cNvPr>
-            <p:cNvSpPr txBox="1"/>
-            <p:nvPr/>
-          </p:nvSpPr>
-          <p:spPr>
-            <a:xfrm flipH="1">
-              <a:off x="1016001" y="6104229"/>
-              <a:ext cx="4953000" cy="292388"/>
-            </a:xfrm>
-            <a:prstGeom prst="rect">
-              <a:avLst/>
-            </a:prstGeom>
-            <a:solidFill>
-              <a:schemeClr val="bg1"/>
-            </a:solidFill>
-          </p:spPr>
-          <p:txBody>
-            <a:bodyPr wrap="square" rtlCol="0">
-              <a:spAutoFit/>
-            </a:bodyPr>
-            <a:lstStyle/>
-            <a:p>
-              <a:pPr algn="ctr"/>
-              <a:r>
-                <a:rPr lang="en-US" sz="1300" dirty="0">
-                  <a:latin typeface="Arial" panose="020B0604020202020204" pitchFamily="34" charset="0"/>
-                  <a:cs typeface="Arial" panose="020B0604020202020204" pitchFamily="34" charset="0"/>
-                </a:rPr>
-                <a:t>influenza virus predicted and observed frequencies</a:t>
-              </a:r>
-            </a:p>
-          </p:txBody>
-        </p:sp>
-      </p:grpSp>
-      <p:sp>
-        <p:nvSpPr>
-          <p:cNvPr id="27" name="TextBox 26">
-            <a:extLst>
-              <a:ext uri="{FF2B5EF4-FFF2-40B4-BE49-F238E27FC236}">
-                <a16:creationId xmlns:a16="http://schemas.microsoft.com/office/drawing/2014/main" id="{81935E4B-29A4-A77C-70CA-D721FF55B503}"/>
+                <a16:creationId xmlns:a16="http://schemas.microsoft.com/office/drawing/2014/main" id="{2C92F0E5-CA4A-95FF-E49D-A54246A347FB}"/>
               </a:ext>
             </a:extLst>
           </p:cNvPr>
@@ -3214,10 +3932,10 @@
       </p:sp>
       <p:sp>
         <p:nvSpPr>
-          <p:cNvPr id="28" name="TextBox 27">
+          <p:cNvPr id="17" name="TextBox 16">
             <a:extLst>
               <a:ext uri="{FF2B5EF4-FFF2-40B4-BE49-F238E27FC236}">
-                <a16:creationId xmlns:a16="http://schemas.microsoft.com/office/drawing/2014/main" id="{BD883556-9D30-97A9-DC05-606C85EB9C1E}"/>
+                <a16:creationId xmlns:a16="http://schemas.microsoft.com/office/drawing/2014/main" id="{568D735F-D4C3-88C2-7C82-55F35C5F1405}"/>
               </a:ext>
             </a:extLst>
           </p:cNvPr>
@@ -3249,10 +3967,10 @@
       </p:sp>
       <p:sp>
         <p:nvSpPr>
-          <p:cNvPr id="29" name="TextBox 28">
+          <p:cNvPr id="18" name="TextBox 17">
             <a:extLst>
               <a:ext uri="{FF2B5EF4-FFF2-40B4-BE49-F238E27FC236}">
-                <a16:creationId xmlns:a16="http://schemas.microsoft.com/office/drawing/2014/main" id="{A6FEEB7C-E4F7-AA87-AA80-A2FB65C7E3AB}"/>
+                <a16:creationId xmlns:a16="http://schemas.microsoft.com/office/drawing/2014/main" id="{887C3C75-F1F8-C43B-FA32-7A0FACC1F404}"/>
               </a:ext>
             </a:extLst>
           </p:cNvPr>
@@ -3278,6 +3996,47 @@
             <a:r>
               <a:rPr lang="en-US" sz="2800" b="1" dirty="0"/>
               <a:t>C</a:t>
+            </a:r>
+          </a:p>
+        </p:txBody>
+      </p:sp>
+      <p:sp>
+        <p:nvSpPr>
+          <p:cNvPr id="19" name="TextBox 18">
+            <a:extLst>
+              <a:ext uri="{FF2B5EF4-FFF2-40B4-BE49-F238E27FC236}">
+                <a16:creationId xmlns:a16="http://schemas.microsoft.com/office/drawing/2014/main" id="{35EF74F8-6A0A-19C5-9C59-472F69D4C866}"/>
+              </a:ext>
+            </a:extLst>
+          </p:cNvPr>
+          <p:cNvSpPr txBox="1"/>
+          <p:nvPr/>
+        </p:nvSpPr>
+        <p:spPr>
+          <a:xfrm flipH="1">
+            <a:off x="1016001" y="5727167"/>
+            <a:ext cx="4953000" cy="292388"/>
+          </a:xfrm>
+          <a:prstGeom prst="rect">
+            <a:avLst/>
+          </a:prstGeom>
+          <a:solidFill>
+            <a:schemeClr val="bg1"/>
+          </a:solidFill>
+        </p:spPr>
+        <p:txBody>
+          <a:bodyPr wrap="square" rtlCol="0">
+            <a:spAutoFit/>
+          </a:bodyPr>
+          <a:lstStyle/>
+          <a:p>
+            <a:pPr algn="ctr"/>
+            <a:r>
+              <a:rPr lang="en-US" sz="1300" dirty="0">
+                <a:latin typeface="Arial" panose="020B0604020202020204" pitchFamily="34" charset="0"/>
+                <a:cs typeface="Arial" panose="020B0604020202020204" pitchFamily="34" charset="0"/>
+              </a:rPr>
+              <a:t>similarity of predicted vs empirical frequencies for many viruses</a:t>
             </a:r>
           </a:p>
         </p:txBody>
@@ -3550,7 +4309,7 @@
   <a:extraClrSchemeLst/>
   <a:extLst>
     <a:ext uri="{05A4C25C-085E-4340-85A3-A5531E510DB2}">
-      <thm15:themeFamily xmlns:thm15="http://schemas.microsoft.com/office/thememl/2012/main" name="Office Theme" id="{62F939B6-93AF-4DB8-9C6B-D6C7DFDC589F}" vid="{4A3C46E8-61CC-4603-A589-7422A47A8E4A}"/>
+      <thm15:themeFamily xmlns:thm15="http://schemas.microsoft.com/office/thememl/2012/main" name="Office Theme 2013 - 2022" id="{62F939B6-93AF-4DB8-9C6B-D6C7DFDC589F}" vid="{4A3C46E8-61CC-4603-A589-7422A47A8E4A}"/>
     </a:ext>
   </a:extLst>
 </a:theme>

</xml_diff>